<commit_message>
Add return arrow in reference frame
</commit_message>
<xml_diff>
--- a/docs/find items.pptx
+++ b/docs/find items.pptx
@@ -357,7 +357,7 @@
           <a:p>
             <a:fld id="{9629A0FB-7277-41B0-BEC2-EE35F8B0CE39}" type="datetimeFigureOut">
               <a:rPr lang="en-SG" smtClean="0"/>
-              <a:t>27/3/2020</a:t>
+              <a:t>2/4/2020</a:t>
             </a:fld>
             <a:endParaRPr lang="en-SG"/>
           </a:p>
@@ -4335,8 +4335,8 @@
         </p:nvSpPr>
         <p:spPr bwMode="auto">
           <a:xfrm>
-            <a:off x="1585926" y="4023841"/>
-            <a:ext cx="3376726" cy="864706"/>
+            <a:off x="1581976" y="3852383"/>
+            <a:ext cx="3380676" cy="1036164"/>
           </a:xfrm>
           <a:prstGeom prst="rect">
             <a:avLst/>
@@ -5403,7 +5403,7 @@
         <p:spPr bwMode="auto">
           <a:xfrm flipV="1">
             <a:off x="1699580" y="3257447"/>
-            <a:ext cx="5858493" cy="35289"/>
+            <a:ext cx="5858493" cy="0"/>
           </a:xfrm>
           <a:prstGeom prst="line">
             <a:avLst/>
@@ -5641,7 +5641,7 @@
         <p:spPr bwMode="auto">
           <a:xfrm flipH="1">
             <a:off x="1689167" y="3565265"/>
-            <a:ext cx="5812666" cy="14589"/>
+            <a:ext cx="5812666" cy="0"/>
           </a:xfrm>
           <a:prstGeom prst="line">
             <a:avLst/>
@@ -5870,7 +5870,7 @@
         </p:nvSpPr>
         <p:spPr bwMode="auto">
           <a:xfrm flipV="1">
-            <a:off x="1722234" y="4531007"/>
+            <a:off x="1722234" y="4482997"/>
             <a:ext cx="2849766" cy="0"/>
           </a:xfrm>
           <a:prstGeom prst="line">
@@ -5915,7 +5915,7 @@
         </p:nvSpPr>
         <p:spPr bwMode="auto">
           <a:xfrm>
-            <a:off x="3685766" y="4482997"/>
+            <a:off x="3581664" y="4140118"/>
             <a:ext cx="823939" cy="381000"/>
           </a:xfrm>
           <a:prstGeom prst="rect">
@@ -6151,7 +6151,7 @@
         </p:nvSpPr>
         <p:spPr>
           <a:xfrm flipV="1">
-            <a:off x="1585926" y="4027054"/>
+            <a:off x="1577712" y="3852383"/>
             <a:ext cx="623875" cy="374579"/>
           </a:xfrm>
           <a:prstGeom prst="snip1Rect">
@@ -6209,7 +6209,7 @@
         </p:nvSpPr>
         <p:spPr bwMode="auto">
           <a:xfrm>
-            <a:off x="1473198" y="4010611"/>
+            <a:off x="1459135" y="3862294"/>
             <a:ext cx="3573067" cy="381000"/>
           </a:xfrm>
           <a:prstGeom prst="rect">
@@ -6374,6 +6374,54 @@
               </a:rPr>
               <a:t>   opt   [t contains keyword]</a:t>
             </a:r>
+          </a:p>
+        </p:txBody>
+      </p:sp>
+      <p:sp>
+        <p:nvSpPr>
+          <p:cNvPr id="24" name="Line 16">
+            <a:extLst>
+              <a:ext uri="{FF2B5EF4-FFF2-40B4-BE49-F238E27FC236}">
+                <a16:creationId xmlns:a16="http://schemas.microsoft.com/office/drawing/2014/main" id="{D5C68D5B-09EB-4FB8-95ED-51290092D8BD}"/>
+              </a:ext>
+            </a:extLst>
+          </p:cNvPr>
+          <p:cNvSpPr>
+            <a:spLocks noChangeShapeType="1"/>
+          </p:cNvSpPr>
+          <p:nvPr/>
+        </p:nvSpPr>
+        <p:spPr bwMode="auto">
+          <a:xfrm flipH="1">
+            <a:off x="1730779" y="4730293"/>
+            <a:ext cx="2826992" cy="0"/>
+          </a:xfrm>
+          <a:prstGeom prst="line">
+            <a:avLst/>
+          </a:prstGeom>
+          <a:noFill/>
+          <a:ln w="19050">
+            <a:solidFill>
+              <a:schemeClr val="accent6">
+                <a:lumMod val="75000"/>
+              </a:schemeClr>
+            </a:solidFill>
+            <a:prstDash val="sysDash"/>
+            <a:round/>
+            <a:headEnd/>
+            <a:tailEnd type="triangle" w="lg" len="lg"/>
+          </a:ln>
+        </p:spPr>
+        <p:txBody>
+          <a:bodyPr/>
+          <a:lstStyle/>
+          <a:p>
+            <a:pPr defTabSz="872733"/>
+            <a:endParaRPr lang="en-US" sz="1500">
+              <a:solidFill>
+                <a:prstClr val="black"/>
+              </a:solidFill>
+            </a:endParaRPr>
           </a:p>
         </p:txBody>
       </p:sp>
@@ -7004,6 +7052,33 @@
                                   </p:childTnLst>
                                 </p:cTn>
                               </p:par>
+                              <p:par>
+                                <p:cTn id="49" presetID="1" presetClass="exit" presetSubtype="0" fill="hold" grpId="0" nodeType="withEffect">
+                                  <p:stCondLst>
+                                    <p:cond delay="0"/>
+                                  </p:stCondLst>
+                                  <p:childTnLst>
+                                    <p:set>
+                                      <p:cBhvr>
+                                        <p:cTn id="50" dur="1" fill="hold">
+                                          <p:stCondLst>
+                                            <p:cond delay="0"/>
+                                          </p:stCondLst>
+                                        </p:cTn>
+                                        <p:tgtEl>
+                                          <p:spTgt spid="24"/>
+                                        </p:tgtEl>
+                                        <p:attrNameLst>
+                                          <p:attrName>style.visibility</p:attrName>
+                                        </p:attrNameLst>
+                                      </p:cBhvr>
+                                      <p:to>
+                                        <p:strVal val="hidden"/>
+                                      </p:to>
+                                    </p:set>
+                                  </p:childTnLst>
+                                </p:cTn>
+                              </p:par>
                             </p:childTnLst>
                           </p:cTn>
                         </p:par>
@@ -7054,6 +7129,7 @@
       <p:bldP spid="33" grpId="0" animBg="1"/>
       <p:bldP spid="65" grpId="0" animBg="1"/>
       <p:bldP spid="67" grpId="0"/>
+      <p:bldP spid="24" grpId="0" animBg="1"/>
     </p:bldLst>
   </p:timing>
 </p:sld>

</xml_diff>